<commit_message>
Modulos Completos en el Panel principal, base de datos final con informacion , ejemplo de reporte
</commit_message>
<xml_diff>
--- a/documentos/sistema/Urgencias.pptx
+++ b/documentos/sistema/Urgencias.pptx
@@ -104,6 +104,11 @@
       </a:defRPr>
     </a:lvl9pPr>
   </p:defaultTextStyle>
+  <p:extLst>
+    <p:ext uri="{EFAFB233-063F-42B5-8137-9DF3F51BA10A}">
+      <p15:sldGuideLst xmlns:p15="http://schemas.microsoft.com/office/powerpoint/2012/main"/>
+    </p:ext>
+  </p:extLst>
 </p:presentation>
 </file>
 
@@ -238,7 +243,7 @@
           <a:p>
             <a:fld id="{85F494E5-47E0-46F2-A5D6-C57539ED99E6}" type="datetimeFigureOut">
               <a:rPr lang="es-MX" smtClean="0"/>
-              <a:t>27/11/2019</a:t>
+              <a:t>02/12/2019</a:t>
             </a:fld>
             <a:endParaRPr lang="es-MX"/>
           </a:p>
@@ -408,7 +413,7 @@
           <a:p>
             <a:fld id="{85F494E5-47E0-46F2-A5D6-C57539ED99E6}" type="datetimeFigureOut">
               <a:rPr lang="es-MX" smtClean="0"/>
-              <a:t>27/11/2019</a:t>
+              <a:t>02/12/2019</a:t>
             </a:fld>
             <a:endParaRPr lang="es-MX"/>
           </a:p>
@@ -588,7 +593,7 @@
           <a:p>
             <a:fld id="{85F494E5-47E0-46F2-A5D6-C57539ED99E6}" type="datetimeFigureOut">
               <a:rPr lang="es-MX" smtClean="0"/>
-              <a:t>27/11/2019</a:t>
+              <a:t>02/12/2019</a:t>
             </a:fld>
             <a:endParaRPr lang="es-MX"/>
           </a:p>
@@ -758,7 +763,7 @@
           <a:p>
             <a:fld id="{85F494E5-47E0-46F2-A5D6-C57539ED99E6}" type="datetimeFigureOut">
               <a:rPr lang="es-MX" smtClean="0"/>
-              <a:t>27/11/2019</a:t>
+              <a:t>02/12/2019</a:t>
             </a:fld>
             <a:endParaRPr lang="es-MX"/>
           </a:p>
@@ -1004,7 +1009,7 @@
           <a:p>
             <a:fld id="{85F494E5-47E0-46F2-A5D6-C57539ED99E6}" type="datetimeFigureOut">
               <a:rPr lang="es-MX" smtClean="0"/>
-              <a:t>27/11/2019</a:t>
+              <a:t>02/12/2019</a:t>
             </a:fld>
             <a:endParaRPr lang="es-MX"/>
           </a:p>
@@ -1236,7 +1241,7 @@
           <a:p>
             <a:fld id="{85F494E5-47E0-46F2-A5D6-C57539ED99E6}" type="datetimeFigureOut">
               <a:rPr lang="es-MX" smtClean="0"/>
-              <a:t>27/11/2019</a:t>
+              <a:t>02/12/2019</a:t>
             </a:fld>
             <a:endParaRPr lang="es-MX"/>
           </a:p>
@@ -1603,7 +1608,7 @@
           <a:p>
             <a:fld id="{85F494E5-47E0-46F2-A5D6-C57539ED99E6}" type="datetimeFigureOut">
               <a:rPr lang="es-MX" smtClean="0"/>
-              <a:t>27/11/2019</a:t>
+              <a:t>02/12/2019</a:t>
             </a:fld>
             <a:endParaRPr lang="es-MX"/>
           </a:p>
@@ -1721,7 +1726,7 @@
           <a:p>
             <a:fld id="{85F494E5-47E0-46F2-A5D6-C57539ED99E6}" type="datetimeFigureOut">
               <a:rPr lang="es-MX" smtClean="0"/>
-              <a:t>27/11/2019</a:t>
+              <a:t>02/12/2019</a:t>
             </a:fld>
             <a:endParaRPr lang="es-MX"/>
           </a:p>
@@ -1816,7 +1821,7 @@
           <a:p>
             <a:fld id="{85F494E5-47E0-46F2-A5D6-C57539ED99E6}" type="datetimeFigureOut">
               <a:rPr lang="es-MX" smtClean="0"/>
-              <a:t>27/11/2019</a:t>
+              <a:t>02/12/2019</a:t>
             </a:fld>
             <a:endParaRPr lang="es-MX"/>
           </a:p>
@@ -2093,7 +2098,7 @@
           <a:p>
             <a:fld id="{85F494E5-47E0-46F2-A5D6-C57539ED99E6}" type="datetimeFigureOut">
               <a:rPr lang="es-MX" smtClean="0"/>
-              <a:t>27/11/2019</a:t>
+              <a:t>02/12/2019</a:t>
             </a:fld>
             <a:endParaRPr lang="es-MX"/>
           </a:p>
@@ -2346,7 +2351,7 @@
           <a:p>
             <a:fld id="{85F494E5-47E0-46F2-A5D6-C57539ED99E6}" type="datetimeFigureOut">
               <a:rPr lang="es-MX" smtClean="0"/>
-              <a:t>27/11/2019</a:t>
+              <a:t>02/12/2019</a:t>
             </a:fld>
             <a:endParaRPr lang="es-MX"/>
           </a:p>
@@ -2559,7 +2564,7 @@
           <a:p>
             <a:fld id="{85F494E5-47E0-46F2-A5D6-C57539ED99E6}" type="datetimeFigureOut">
               <a:rPr lang="es-MX" smtClean="0"/>
-              <a:t>27/11/2019</a:t>
+              <a:t>02/12/2019</a:t>
             </a:fld>
             <a:endParaRPr lang="es-MX"/>
           </a:p>
@@ -3076,7 +3081,7 @@
         </p:nvSpPr>
         <p:spPr>
           <a:xfrm>
-            <a:off x="196948" y="658837"/>
+            <a:off x="196948" y="685789"/>
             <a:ext cx="1716258" cy="618978"/>
           </a:xfrm>
           <a:prstGeom prst="rect">
@@ -3120,7 +3125,7 @@
         </p:nvSpPr>
         <p:spPr>
           <a:xfrm>
-            <a:off x="196948" y="5345723"/>
+            <a:off x="171328" y="5358890"/>
             <a:ext cx="1716258" cy="618978"/>
           </a:xfrm>
           <a:prstGeom prst="rect">
@@ -4126,6 +4131,430 @@
           </a:fontRef>
         </p:style>
       </p:cxnSp>
+      <p:sp>
+        <p:nvSpPr>
+          <p:cNvPr id="2" name="Elipse 1"/>
+          <p:cNvSpPr/>
+          <p:nvPr/>
+        </p:nvSpPr>
+        <p:spPr>
+          <a:xfrm>
+            <a:off x="1677442" y="2309587"/>
+            <a:ext cx="3366273" cy="331048"/>
+          </a:xfrm>
+          <a:prstGeom prst="ellipse">
+            <a:avLst/>
+          </a:prstGeom>
+        </p:spPr>
+        <p:style>
+          <a:lnRef idx="2">
+            <a:schemeClr val="accent1">
+              <a:shade val="50000"/>
+            </a:schemeClr>
+          </a:lnRef>
+          <a:fillRef idx="1">
+            <a:schemeClr val="accent1"/>
+          </a:fillRef>
+          <a:effectRef idx="0">
+            <a:schemeClr val="accent1"/>
+          </a:effectRef>
+          <a:fontRef idx="minor">
+            <a:schemeClr val="lt1"/>
+          </a:fontRef>
+        </p:style>
+        <p:txBody>
+          <a:bodyPr rtlCol="0" anchor="ctr"/>
+          <a:lstStyle/>
+          <a:p>
+            <a:pPr algn="ctr"/>
+            <a:r>
+              <a:rPr lang="es-MX" dirty="0" err="1"/>
+              <a:t>atenciones_paciente</a:t>
+            </a:r>
+            <a:endParaRPr lang="es-MX" dirty="0"/>
+          </a:p>
+        </p:txBody>
+      </p:sp>
+      <p:cxnSp>
+        <p:nvCxnSpPr>
+          <p:cNvPr id="4" name="Conector recto de flecha 3"/>
+          <p:cNvCxnSpPr>
+            <a:stCxn id="12" idx="0"/>
+            <a:endCxn id="2" idx="4"/>
+          </p:cNvCxnSpPr>
+          <p:nvPr/>
+        </p:nvCxnSpPr>
+        <p:spPr>
+          <a:xfrm flipV="1">
+            <a:off x="3360579" y="2640635"/>
+            <a:ext cx="0" cy="292366"/>
+          </a:xfrm>
+          <a:prstGeom prst="straightConnector1">
+            <a:avLst/>
+          </a:prstGeom>
+          <a:ln>
+            <a:tailEnd type="triangle"/>
+          </a:ln>
+        </p:spPr>
+        <p:style>
+          <a:lnRef idx="1">
+            <a:schemeClr val="accent1"/>
+          </a:lnRef>
+          <a:fillRef idx="0">
+            <a:schemeClr val="accent1"/>
+          </a:fillRef>
+          <a:effectRef idx="0">
+            <a:schemeClr val="accent1"/>
+          </a:effectRef>
+          <a:fontRef idx="minor">
+            <a:schemeClr val="tx1"/>
+          </a:fontRef>
+        </p:style>
+      </p:cxnSp>
+      <p:sp>
+        <p:nvSpPr>
+          <p:cNvPr id="20" name="CuadroTexto 19"/>
+          <p:cNvSpPr txBox="1"/>
+          <p:nvPr/>
+        </p:nvSpPr>
+        <p:spPr>
+          <a:xfrm>
+            <a:off x="3350073" y="2602152"/>
+            <a:ext cx="245507" cy="369332"/>
+          </a:xfrm>
+          <a:prstGeom prst="rect">
+            <a:avLst/>
+          </a:prstGeom>
+          <a:noFill/>
+        </p:spPr>
+        <p:txBody>
+          <a:bodyPr wrap="square" rtlCol="0">
+            <a:spAutoFit/>
+          </a:bodyPr>
+          <a:lstStyle/>
+          <a:p>
+            <a:r>
+              <a:rPr lang="es-MX" dirty="0" smtClean="0"/>
+              <a:t>+</a:t>
+            </a:r>
+            <a:endParaRPr lang="es-MX" dirty="0"/>
+          </a:p>
+        </p:txBody>
+      </p:sp>
+      <p:sp>
+        <p:nvSpPr>
+          <p:cNvPr id="36" name="Rectángulo redondeado 35"/>
+          <p:cNvSpPr/>
+          <p:nvPr/>
+        </p:nvSpPr>
+        <p:spPr>
+          <a:xfrm>
+            <a:off x="7988037" y="161616"/>
+            <a:ext cx="2963182" cy="1297303"/>
+          </a:xfrm>
+          <a:prstGeom prst="roundRect">
+            <a:avLst/>
+          </a:prstGeom>
+          <a:solidFill>
+            <a:srgbClr val="E93535"/>
+          </a:solidFill>
+        </p:spPr>
+        <p:style>
+          <a:lnRef idx="3">
+            <a:schemeClr val="lt1"/>
+          </a:lnRef>
+          <a:fillRef idx="1">
+            <a:schemeClr val="accent2"/>
+          </a:fillRef>
+          <a:effectRef idx="1">
+            <a:schemeClr val="accent2"/>
+          </a:effectRef>
+          <a:fontRef idx="minor">
+            <a:schemeClr val="lt1"/>
+          </a:fontRef>
+        </p:style>
+        <p:txBody>
+          <a:bodyPr rtlCol="0" anchor="ctr"/>
+          <a:lstStyle/>
+          <a:p>
+            <a:pPr algn="ctr"/>
+            <a:r>
+              <a:rPr lang="es-MX" b="1" dirty="0" smtClean="0">
+                <a:ln w="10160">
+                  <a:solidFill>
+                    <a:schemeClr val="accent5"/>
+                  </a:solidFill>
+                  <a:prstDash val="solid"/>
+                </a:ln>
+                <a:solidFill>
+                  <a:srgbClr val="FFFFFF"/>
+                </a:solidFill>
+                <a:effectLst>
+                  <a:outerShdw blurRad="38100" dist="22860" dir="5400000" algn="tl" rotWithShape="0">
+                    <a:srgbClr val="000000">
+                      <a:alpha val="30000"/>
+                    </a:srgbClr>
+                  </a:outerShdw>
+                </a:effectLst>
+              </a:rPr>
+              <a:t>En la lista de los consultorios solo debe de aparecer los de urgencias</a:t>
+            </a:r>
+            <a:endParaRPr lang="es-MX" b="1" dirty="0">
+              <a:ln w="10160">
+                <a:solidFill>
+                  <a:schemeClr val="accent5"/>
+                </a:solidFill>
+                <a:prstDash val="solid"/>
+              </a:ln>
+              <a:solidFill>
+                <a:srgbClr val="FFFFFF"/>
+              </a:solidFill>
+              <a:effectLst>
+                <a:outerShdw blurRad="38100" dist="22860" dir="5400000" algn="tl" rotWithShape="0">
+                  <a:srgbClr val="000000">
+                    <a:alpha val="30000"/>
+                  </a:srgbClr>
+                </a:outerShdw>
+              </a:effectLst>
+            </a:endParaRPr>
+          </a:p>
+        </p:txBody>
+      </p:sp>
+      <p:cxnSp>
+        <p:nvCxnSpPr>
+          <p:cNvPr id="6" name="Conector recto de flecha 5"/>
+          <p:cNvCxnSpPr>
+            <a:stCxn id="10" idx="3"/>
+            <a:endCxn id="14" idx="1"/>
+          </p:cNvCxnSpPr>
+          <p:nvPr/>
+        </p:nvCxnSpPr>
+        <p:spPr>
+          <a:xfrm>
+            <a:off x="1913206" y="995278"/>
+            <a:ext cx="1920224" cy="18712"/>
+          </a:xfrm>
+          <a:prstGeom prst="straightConnector1">
+            <a:avLst/>
+          </a:prstGeom>
+          <a:ln>
+            <a:tailEnd type="triangle"/>
+          </a:ln>
+        </p:spPr>
+        <p:style>
+          <a:lnRef idx="1">
+            <a:schemeClr val="accent1"/>
+          </a:lnRef>
+          <a:fillRef idx="0">
+            <a:schemeClr val="accent1"/>
+          </a:fillRef>
+          <a:effectRef idx="0">
+            <a:schemeClr val="accent1"/>
+          </a:effectRef>
+          <a:fontRef idx="minor">
+            <a:schemeClr val="tx1"/>
+          </a:fontRef>
+        </p:style>
+      </p:cxnSp>
+      <p:cxnSp>
+        <p:nvCxnSpPr>
+          <p:cNvPr id="16" name="Conector recto de flecha 15"/>
+          <p:cNvCxnSpPr>
+            <a:stCxn id="11" idx="3"/>
+            <a:endCxn id="13" idx="1"/>
+          </p:cNvCxnSpPr>
+          <p:nvPr/>
+        </p:nvCxnSpPr>
+        <p:spPr>
+          <a:xfrm>
+            <a:off x="1887586" y="5668379"/>
+            <a:ext cx="397607" cy="0"/>
+          </a:xfrm>
+          <a:prstGeom prst="straightConnector1">
+            <a:avLst/>
+          </a:prstGeom>
+          <a:ln>
+            <a:tailEnd type="triangle"/>
+          </a:ln>
+        </p:spPr>
+        <p:style>
+          <a:lnRef idx="1">
+            <a:schemeClr val="accent1"/>
+          </a:lnRef>
+          <a:fillRef idx="0">
+            <a:schemeClr val="accent1"/>
+          </a:fillRef>
+          <a:effectRef idx="0">
+            <a:schemeClr val="accent1"/>
+          </a:effectRef>
+          <a:fontRef idx="minor">
+            <a:schemeClr val="tx1"/>
+          </a:fontRef>
+        </p:style>
+      </p:cxnSp>
+      <p:sp>
+        <p:nvSpPr>
+          <p:cNvPr id="38" name="Rectángulo 37"/>
+          <p:cNvSpPr/>
+          <p:nvPr/>
+        </p:nvSpPr>
+        <p:spPr>
+          <a:xfrm>
+            <a:off x="3256755" y="6053048"/>
+            <a:ext cx="3051285" cy="923330"/>
+          </a:xfrm>
+          <a:prstGeom prst="rect">
+            <a:avLst/>
+          </a:prstGeom>
+          <a:noFill/>
+        </p:spPr>
+        <p:txBody>
+          <a:bodyPr wrap="none" lIns="91440" tIns="45720" rIns="91440" bIns="45720">
+            <a:spAutoFit/>
+          </a:bodyPr>
+          <a:lstStyle>
+            <a:defPPr>
+              <a:defRPr lang="es-MX"/>
+            </a:defPPr>
+            <a:lvl1pPr marL="0" algn="l" defTabSz="914400" rtl="0" eaLnBrk="1" latinLnBrk="0" hangingPunct="1">
+              <a:defRPr sz="1800" kern="1200">
+                <a:solidFill>
+                  <a:schemeClr val="tx1"/>
+                </a:solidFill>
+                <a:latin typeface="+mn-lt"/>
+                <a:ea typeface="+mn-ea"/>
+                <a:cs typeface="+mn-cs"/>
+              </a:defRPr>
+            </a:lvl1pPr>
+            <a:lvl2pPr marL="457200" algn="l" defTabSz="914400" rtl="0" eaLnBrk="1" latinLnBrk="0" hangingPunct="1">
+              <a:defRPr sz="1800" kern="1200">
+                <a:solidFill>
+                  <a:schemeClr val="tx1"/>
+                </a:solidFill>
+                <a:latin typeface="+mn-lt"/>
+                <a:ea typeface="+mn-ea"/>
+                <a:cs typeface="+mn-cs"/>
+              </a:defRPr>
+            </a:lvl2pPr>
+            <a:lvl3pPr marL="914400" algn="l" defTabSz="914400" rtl="0" eaLnBrk="1" latinLnBrk="0" hangingPunct="1">
+              <a:defRPr sz="1800" kern="1200">
+                <a:solidFill>
+                  <a:schemeClr val="tx1"/>
+                </a:solidFill>
+                <a:latin typeface="+mn-lt"/>
+                <a:ea typeface="+mn-ea"/>
+                <a:cs typeface="+mn-cs"/>
+              </a:defRPr>
+            </a:lvl3pPr>
+            <a:lvl4pPr marL="1371600" algn="l" defTabSz="914400" rtl="0" eaLnBrk="1" latinLnBrk="0" hangingPunct="1">
+              <a:defRPr sz="1800" kern="1200">
+                <a:solidFill>
+                  <a:schemeClr val="tx1"/>
+                </a:solidFill>
+                <a:latin typeface="+mn-lt"/>
+                <a:ea typeface="+mn-ea"/>
+                <a:cs typeface="+mn-cs"/>
+              </a:defRPr>
+            </a:lvl4pPr>
+            <a:lvl5pPr marL="1828800" algn="l" defTabSz="914400" rtl="0" eaLnBrk="1" latinLnBrk="0" hangingPunct="1">
+              <a:defRPr sz="1800" kern="1200">
+                <a:solidFill>
+                  <a:schemeClr val="tx1"/>
+                </a:solidFill>
+                <a:latin typeface="+mn-lt"/>
+                <a:ea typeface="+mn-ea"/>
+                <a:cs typeface="+mn-cs"/>
+              </a:defRPr>
+            </a:lvl5pPr>
+            <a:lvl6pPr marL="2286000" algn="l" defTabSz="914400" rtl="0" eaLnBrk="1" latinLnBrk="0" hangingPunct="1">
+              <a:defRPr sz="1800" kern="1200">
+                <a:solidFill>
+                  <a:schemeClr val="tx1"/>
+                </a:solidFill>
+                <a:latin typeface="+mn-lt"/>
+                <a:ea typeface="+mn-ea"/>
+                <a:cs typeface="+mn-cs"/>
+              </a:defRPr>
+            </a:lvl6pPr>
+            <a:lvl7pPr marL="2743200" algn="l" defTabSz="914400" rtl="0" eaLnBrk="1" latinLnBrk="0" hangingPunct="1">
+              <a:defRPr sz="1800" kern="1200">
+                <a:solidFill>
+                  <a:schemeClr val="tx1"/>
+                </a:solidFill>
+                <a:latin typeface="+mn-lt"/>
+                <a:ea typeface="+mn-ea"/>
+                <a:cs typeface="+mn-cs"/>
+              </a:defRPr>
+            </a:lvl7pPr>
+            <a:lvl8pPr marL="3200400" algn="l" defTabSz="914400" rtl="0" eaLnBrk="1" latinLnBrk="0" hangingPunct="1">
+              <a:defRPr sz="1800" kern="1200">
+                <a:solidFill>
+                  <a:schemeClr val="tx1"/>
+                </a:solidFill>
+                <a:latin typeface="+mn-lt"/>
+                <a:ea typeface="+mn-ea"/>
+                <a:cs typeface="+mn-cs"/>
+              </a:defRPr>
+            </a:lvl8pPr>
+            <a:lvl9pPr marL="3657600" algn="l" defTabSz="914400" rtl="0" eaLnBrk="1" latinLnBrk="0" hangingPunct="1">
+              <a:defRPr sz="1800" kern="1200">
+                <a:solidFill>
+                  <a:schemeClr val="tx1"/>
+                </a:solidFill>
+                <a:latin typeface="+mn-lt"/>
+                <a:ea typeface="+mn-ea"/>
+                <a:cs typeface="+mn-cs"/>
+              </a:defRPr>
+            </a:lvl9pPr>
+          </a:lstStyle>
+          <a:p>
+            <a:pPr algn="ctr"/>
+            <a:r>
+              <a:rPr lang="es-ES" sz="5400" b="1" cap="none" spc="50" dirty="0" smtClean="0">
+                <a:ln w="9525" cmpd="sng">
+                  <a:solidFill>
+                    <a:schemeClr val="accent1"/>
+                  </a:solidFill>
+                  <a:prstDash val="solid"/>
+                </a:ln>
+                <a:solidFill>
+                  <a:srgbClr val="70AD47">
+                    <a:tint val="1000"/>
+                  </a:srgbClr>
+                </a:solidFill>
+                <a:effectLst>
+                  <a:glow rad="38100">
+                    <a:schemeClr val="accent1">
+                      <a:alpha val="40000"/>
+                    </a:schemeClr>
+                  </a:glow>
+                </a:effectLst>
+              </a:rPr>
+              <a:t>Urgencias</a:t>
+            </a:r>
+            <a:endParaRPr lang="es-ES" sz="5400" b="1" cap="none" spc="50" dirty="0">
+              <a:ln w="9525" cmpd="sng">
+                <a:solidFill>
+                  <a:schemeClr val="accent1"/>
+                </a:solidFill>
+                <a:prstDash val="solid"/>
+              </a:ln>
+              <a:solidFill>
+                <a:srgbClr val="70AD47">
+                  <a:tint val="1000"/>
+                </a:srgbClr>
+              </a:solidFill>
+              <a:effectLst>
+                <a:glow rad="38100">
+                  <a:schemeClr val="accent1">
+                    <a:alpha val="40000"/>
+                  </a:schemeClr>
+                </a:glow>
+              </a:effectLst>
+            </a:endParaRPr>
+          </a:p>
+        </p:txBody>
+      </p:sp>
     </p:spTree>
     <p:extLst>
       <p:ext uri="{BB962C8B-B14F-4D97-AF65-F5344CB8AC3E}">

</xml_diff>